<commit_message>
feat(deploy): test deployment to kubernetes azure
</commit_message>
<xml_diff>
--- a/documentation/Architecture.pptx
+++ b/documentation/Architecture.pptx
@@ -8,6 +8,7 @@
     <p:sldId id="257" r:id="rId2"/>
     <p:sldId id="259" r:id="rId3"/>
     <p:sldId id="258" r:id="rId4"/>
+    <p:sldId id="260" r:id="rId5"/>
   </p:sldIdLst>
   <p:sldSz cx="12192000" cy="6858000"/>
   <p:notesSz cx="6858000" cy="9144000"/>
@@ -106,6 +107,11 @@
       </a:defRPr>
     </a:lvl9pPr>
   </p:defaultTextStyle>
+  <p:extLst>
+    <p:ext uri="{EFAFB233-063F-42B5-8137-9DF3F51BA10A}">
+      <p15:sldGuideLst xmlns:p15="http://schemas.microsoft.com/office/powerpoint/2012/main"/>
+    </p:ext>
+  </p:extLst>
 </p:presentation>
 </file>
 
@@ -256,7 +262,7 @@
           <a:p>
             <a:fld id="{2FADB740-130C-40E2-9E3D-8BF44594D57F}" type="datetimeFigureOut">
               <a:rPr lang="fr-FR" smtClean="0"/>
-              <a:t>11/10/2024</a:t>
+              <a:t>30/10/2024</a:t>
             </a:fld>
             <a:endParaRPr lang="fr-FR"/>
           </a:p>
@@ -454,7 +460,7 @@
           <a:p>
             <a:fld id="{2FADB740-130C-40E2-9E3D-8BF44594D57F}" type="datetimeFigureOut">
               <a:rPr lang="fr-FR" smtClean="0"/>
-              <a:t>11/10/2024</a:t>
+              <a:t>30/10/2024</a:t>
             </a:fld>
             <a:endParaRPr lang="fr-FR"/>
           </a:p>
@@ -662,7 +668,7 @@
           <a:p>
             <a:fld id="{2FADB740-130C-40E2-9E3D-8BF44594D57F}" type="datetimeFigureOut">
               <a:rPr lang="fr-FR" smtClean="0"/>
-              <a:t>11/10/2024</a:t>
+              <a:t>30/10/2024</a:t>
             </a:fld>
             <a:endParaRPr lang="fr-FR"/>
           </a:p>
@@ -860,7 +866,7 @@
           <a:p>
             <a:fld id="{2FADB740-130C-40E2-9E3D-8BF44594D57F}" type="datetimeFigureOut">
               <a:rPr lang="fr-FR" smtClean="0"/>
-              <a:t>11/10/2024</a:t>
+              <a:t>30/10/2024</a:t>
             </a:fld>
             <a:endParaRPr lang="fr-FR"/>
           </a:p>
@@ -1135,7 +1141,7 @@
           <a:p>
             <a:fld id="{2FADB740-130C-40E2-9E3D-8BF44594D57F}" type="datetimeFigureOut">
               <a:rPr lang="fr-FR" smtClean="0"/>
-              <a:t>11/10/2024</a:t>
+              <a:t>30/10/2024</a:t>
             </a:fld>
             <a:endParaRPr lang="fr-FR"/>
           </a:p>
@@ -1400,7 +1406,7 @@
           <a:p>
             <a:fld id="{2FADB740-130C-40E2-9E3D-8BF44594D57F}" type="datetimeFigureOut">
               <a:rPr lang="fr-FR" smtClean="0"/>
-              <a:t>11/10/2024</a:t>
+              <a:t>30/10/2024</a:t>
             </a:fld>
             <a:endParaRPr lang="fr-FR"/>
           </a:p>
@@ -1812,7 +1818,7 @@
           <a:p>
             <a:fld id="{2FADB740-130C-40E2-9E3D-8BF44594D57F}" type="datetimeFigureOut">
               <a:rPr lang="fr-FR" smtClean="0"/>
-              <a:t>11/10/2024</a:t>
+              <a:t>30/10/2024</a:t>
             </a:fld>
             <a:endParaRPr lang="fr-FR"/>
           </a:p>
@@ -1953,7 +1959,7 @@
           <a:p>
             <a:fld id="{2FADB740-130C-40E2-9E3D-8BF44594D57F}" type="datetimeFigureOut">
               <a:rPr lang="fr-FR" smtClean="0"/>
-              <a:t>11/10/2024</a:t>
+              <a:t>30/10/2024</a:t>
             </a:fld>
             <a:endParaRPr lang="fr-FR"/>
           </a:p>
@@ -2066,7 +2072,7 @@
           <a:p>
             <a:fld id="{2FADB740-130C-40E2-9E3D-8BF44594D57F}" type="datetimeFigureOut">
               <a:rPr lang="fr-FR" smtClean="0"/>
-              <a:t>11/10/2024</a:t>
+              <a:t>30/10/2024</a:t>
             </a:fld>
             <a:endParaRPr lang="fr-FR"/>
           </a:p>
@@ -2377,7 +2383,7 @@
           <a:p>
             <a:fld id="{2FADB740-130C-40E2-9E3D-8BF44594D57F}" type="datetimeFigureOut">
               <a:rPr lang="fr-FR" smtClean="0"/>
-              <a:t>11/10/2024</a:t>
+              <a:t>30/10/2024</a:t>
             </a:fld>
             <a:endParaRPr lang="fr-FR"/>
           </a:p>
@@ -2665,7 +2671,7 @@
           <a:p>
             <a:fld id="{2FADB740-130C-40E2-9E3D-8BF44594D57F}" type="datetimeFigureOut">
               <a:rPr lang="fr-FR" smtClean="0"/>
-              <a:t>11/10/2024</a:t>
+              <a:t>30/10/2024</a:t>
             </a:fld>
             <a:endParaRPr lang="fr-FR"/>
           </a:p>
@@ -2906,7 +2912,7 @@
           <a:p>
             <a:fld id="{2FADB740-130C-40E2-9E3D-8BF44594D57F}" type="datetimeFigureOut">
               <a:rPr lang="fr-FR" smtClean="0"/>
-              <a:t>11/10/2024</a:t>
+              <a:t>30/10/2024</a:t>
             </a:fld>
             <a:endParaRPr lang="fr-FR"/>
           </a:p>
@@ -5224,6 +5230,1290 @@
 </p:sld>
 </file>
 
+<file path=ppt/slides/slide4.xml><?xml version="1.0" encoding="utf-8"?>
+<p:sld xmlns:a="http://schemas.openxmlformats.org/drawingml/2006/main" xmlns:r="http://schemas.openxmlformats.org/officeDocument/2006/relationships" xmlns:p="http://schemas.openxmlformats.org/presentationml/2006/main">
+  <p:cSld>
+    <p:spTree>
+      <p:nvGrpSpPr>
+        <p:cNvPr id="1" name="">
+          <a:extLst>
+            <a:ext uri="{FF2B5EF4-FFF2-40B4-BE49-F238E27FC236}">
+              <a16:creationId xmlns:a16="http://schemas.microsoft.com/office/drawing/2014/main" id="{ACFFE0A9-408A-C8BC-D365-ED2D78CAC7A0}"/>
+            </a:ext>
+          </a:extLst>
+        </p:cNvPr>
+        <p:cNvGrpSpPr/>
+        <p:nvPr/>
+      </p:nvGrpSpPr>
+      <p:grpSpPr>
+        <a:xfrm>
+          <a:off x="0" y="0"/>
+          <a:ext cx="0" cy="0"/>
+          <a:chOff x="0" y="0"/>
+          <a:chExt cx="0" cy="0"/>
+        </a:xfrm>
+      </p:grpSpPr>
+      <p:sp>
+        <p:nvSpPr>
+          <p:cNvPr id="4" name="Rectangle 3">
+            <a:extLst>
+              <a:ext uri="{FF2B5EF4-FFF2-40B4-BE49-F238E27FC236}">
+                <a16:creationId xmlns:a16="http://schemas.microsoft.com/office/drawing/2014/main" id="{E34D4847-A28E-74B0-B3C0-0894B21751D1}"/>
+              </a:ext>
+            </a:extLst>
+          </p:cNvPr>
+          <p:cNvSpPr/>
+          <p:nvPr/>
+        </p:nvSpPr>
+        <p:spPr>
+          <a:xfrm>
+            <a:off x="4430924" y="2383055"/>
+            <a:ext cx="1030942" cy="735106"/>
+          </a:xfrm>
+          <a:prstGeom prst="rect">
+            <a:avLst/>
+          </a:prstGeom>
+        </p:spPr>
+        <p:style>
+          <a:lnRef idx="2">
+            <a:schemeClr val="accent1">
+              <a:shade val="15000"/>
+            </a:schemeClr>
+          </a:lnRef>
+          <a:fillRef idx="1">
+            <a:schemeClr val="accent1"/>
+          </a:fillRef>
+          <a:effectRef idx="0">
+            <a:schemeClr val="accent1"/>
+          </a:effectRef>
+          <a:fontRef idx="minor">
+            <a:schemeClr val="lt1"/>
+          </a:fontRef>
+        </p:style>
+        <p:txBody>
+          <a:bodyPr rtlCol="0" anchor="ctr"/>
+          <a:lstStyle/>
+          <a:p>
+            <a:pPr algn="ctr"/>
+            <a:r>
+              <a:rPr lang="fr-FR" dirty="0"/>
+              <a:t>API Fast API</a:t>
+            </a:r>
+          </a:p>
+        </p:txBody>
+      </p:sp>
+      <p:sp>
+        <p:nvSpPr>
+          <p:cNvPr id="10" name="Rectangle 9">
+            <a:extLst>
+              <a:ext uri="{FF2B5EF4-FFF2-40B4-BE49-F238E27FC236}">
+                <a16:creationId xmlns:a16="http://schemas.microsoft.com/office/drawing/2014/main" id="{8A294410-F1E0-FD71-A5B9-C43B387BD06E}"/>
+              </a:ext>
+            </a:extLst>
+          </p:cNvPr>
+          <p:cNvSpPr/>
+          <p:nvPr/>
+        </p:nvSpPr>
+        <p:spPr>
+          <a:xfrm>
+            <a:off x="3729317" y="520407"/>
+            <a:ext cx="8273385" cy="5851518"/>
+          </a:xfrm>
+          <a:prstGeom prst="rect">
+            <a:avLst/>
+          </a:prstGeom>
+          <a:noFill/>
+          <a:ln w="38100">
+            <a:solidFill>
+              <a:srgbClr val="C00000"/>
+            </a:solidFill>
+          </a:ln>
+        </p:spPr>
+        <p:style>
+          <a:lnRef idx="2">
+            <a:schemeClr val="accent1">
+              <a:shade val="15000"/>
+            </a:schemeClr>
+          </a:lnRef>
+          <a:fillRef idx="1">
+            <a:schemeClr val="accent1"/>
+          </a:fillRef>
+          <a:effectRef idx="0">
+            <a:schemeClr val="accent1"/>
+          </a:effectRef>
+          <a:fontRef idx="minor">
+            <a:schemeClr val="lt1"/>
+          </a:fontRef>
+        </p:style>
+        <p:txBody>
+          <a:bodyPr rtlCol="0" anchor="ctr"/>
+          <a:lstStyle/>
+          <a:p>
+            <a:pPr algn="ctr"/>
+            <a:endParaRPr lang="fr-FR"/>
+          </a:p>
+        </p:txBody>
+      </p:sp>
+      <p:sp>
+        <p:nvSpPr>
+          <p:cNvPr id="11" name="ZoneTexte 10">
+            <a:extLst>
+              <a:ext uri="{FF2B5EF4-FFF2-40B4-BE49-F238E27FC236}">
+                <a16:creationId xmlns:a16="http://schemas.microsoft.com/office/drawing/2014/main" id="{BB1826B3-9E91-ACC1-5095-0BE05AC6C41D}"/>
+              </a:ext>
+            </a:extLst>
+          </p:cNvPr>
+          <p:cNvSpPr txBox="1"/>
+          <p:nvPr/>
+        </p:nvSpPr>
+        <p:spPr>
+          <a:xfrm>
+            <a:off x="3722990" y="565158"/>
+            <a:ext cx="3730060" cy="369332"/>
+          </a:xfrm>
+          <a:prstGeom prst="rect">
+            <a:avLst/>
+          </a:prstGeom>
+          <a:noFill/>
+        </p:spPr>
+        <p:txBody>
+          <a:bodyPr wrap="none" rtlCol="0">
+            <a:spAutoFit/>
+          </a:bodyPr>
+          <a:lstStyle/>
+          <a:p>
+            <a:r>
+              <a:rPr lang="fr-FR" dirty="0"/>
+              <a:t>Namespace Kubernetes : poc-whipser</a:t>
+            </a:r>
+          </a:p>
+        </p:txBody>
+      </p:sp>
+      <p:sp>
+        <p:nvSpPr>
+          <p:cNvPr id="12" name="Rectangle 11">
+            <a:extLst>
+              <a:ext uri="{FF2B5EF4-FFF2-40B4-BE49-F238E27FC236}">
+                <a16:creationId xmlns:a16="http://schemas.microsoft.com/office/drawing/2014/main" id="{5D707E34-189B-BB01-7CEE-293F3D8D2710}"/>
+              </a:ext>
+            </a:extLst>
+          </p:cNvPr>
+          <p:cNvSpPr/>
+          <p:nvPr/>
+        </p:nvSpPr>
+        <p:spPr>
+          <a:xfrm>
+            <a:off x="325536" y="2107933"/>
+            <a:ext cx="875898" cy="1321067"/>
+          </a:xfrm>
+          <a:prstGeom prst="rect">
+            <a:avLst/>
+          </a:prstGeom>
+        </p:spPr>
+        <p:style>
+          <a:lnRef idx="2">
+            <a:schemeClr val="accent1">
+              <a:shade val="15000"/>
+            </a:schemeClr>
+          </a:lnRef>
+          <a:fillRef idx="1">
+            <a:schemeClr val="accent1"/>
+          </a:fillRef>
+          <a:effectRef idx="0">
+            <a:schemeClr val="accent1"/>
+          </a:effectRef>
+          <a:fontRef idx="minor">
+            <a:schemeClr val="lt1"/>
+          </a:fontRef>
+        </p:style>
+        <p:txBody>
+          <a:bodyPr rtlCol="0" anchor="ctr"/>
+          <a:lstStyle/>
+          <a:p>
+            <a:pPr algn="ctr"/>
+            <a:r>
+              <a:rPr lang="fr-FR" dirty="0"/>
+              <a:t>User App</a:t>
+            </a:r>
+          </a:p>
+        </p:txBody>
+      </p:sp>
+      <p:cxnSp>
+        <p:nvCxnSpPr>
+          <p:cNvPr id="14" name="Connecteur droit avec flèche 13">
+            <a:extLst>
+              <a:ext uri="{FF2B5EF4-FFF2-40B4-BE49-F238E27FC236}">
+                <a16:creationId xmlns:a16="http://schemas.microsoft.com/office/drawing/2014/main" id="{1B76673F-74B0-4C62-7383-0CF59AA4257A}"/>
+              </a:ext>
+            </a:extLst>
+          </p:cNvPr>
+          <p:cNvCxnSpPr>
+            <a:cxnSpLocks/>
+          </p:cNvCxnSpPr>
+          <p:nvPr/>
+        </p:nvCxnSpPr>
+        <p:spPr>
+          <a:xfrm>
+            <a:off x="1216676" y="2554846"/>
+            <a:ext cx="3214248" cy="0"/>
+          </a:xfrm>
+          <a:prstGeom prst="straightConnector1">
+            <a:avLst/>
+          </a:prstGeom>
+          <a:ln w="25400">
+            <a:solidFill>
+              <a:srgbClr val="00B050"/>
+            </a:solidFill>
+            <a:headEnd type="none"/>
+            <a:tailEnd type="triangle"/>
+          </a:ln>
+        </p:spPr>
+        <p:style>
+          <a:lnRef idx="1">
+            <a:schemeClr val="accent1"/>
+          </a:lnRef>
+          <a:fillRef idx="0">
+            <a:schemeClr val="accent1"/>
+          </a:fillRef>
+          <a:effectRef idx="0">
+            <a:schemeClr val="accent1"/>
+          </a:effectRef>
+          <a:fontRef idx="minor">
+            <a:schemeClr val="tx1"/>
+          </a:fontRef>
+        </p:style>
+      </p:cxnSp>
+      <p:sp>
+        <p:nvSpPr>
+          <p:cNvPr id="15" name="ZoneTexte 14">
+            <a:extLst>
+              <a:ext uri="{FF2B5EF4-FFF2-40B4-BE49-F238E27FC236}">
+                <a16:creationId xmlns:a16="http://schemas.microsoft.com/office/drawing/2014/main" id="{D4D40D43-3F41-A49E-EF3E-E0858B88B7F0}"/>
+              </a:ext>
+            </a:extLst>
+          </p:cNvPr>
+          <p:cNvSpPr txBox="1"/>
+          <p:nvPr/>
+        </p:nvSpPr>
+        <p:spPr>
+          <a:xfrm>
+            <a:off x="1497318" y="3229769"/>
+            <a:ext cx="1916807" cy="369332"/>
+          </a:xfrm>
+          <a:prstGeom prst="rect">
+            <a:avLst/>
+          </a:prstGeom>
+          <a:noFill/>
+        </p:spPr>
+        <p:txBody>
+          <a:bodyPr wrap="square" rtlCol="0">
+            <a:spAutoFit/>
+          </a:bodyPr>
+          <a:lstStyle/>
+          <a:p>
+            <a:r>
+              <a:rPr lang="fr-FR" dirty="0"/>
+              <a:t>HTTP </a:t>
+            </a:r>
+            <a:r>
+              <a:rPr lang="fr-FR" dirty="0" err="1"/>
+              <a:t>EventSource</a:t>
+            </a:r>
+            <a:r>
+              <a:rPr lang="fr-FR" dirty="0"/>
+              <a:t> </a:t>
+            </a:r>
+          </a:p>
+        </p:txBody>
+      </p:sp>
+      <p:sp>
+        <p:nvSpPr>
+          <p:cNvPr id="3" name="ZoneTexte 2">
+            <a:extLst>
+              <a:ext uri="{FF2B5EF4-FFF2-40B4-BE49-F238E27FC236}">
+                <a16:creationId xmlns:a16="http://schemas.microsoft.com/office/drawing/2014/main" id="{8B237044-491F-C433-266D-9ADC28F6317F}"/>
+              </a:ext>
+            </a:extLst>
+          </p:cNvPr>
+          <p:cNvSpPr txBox="1"/>
+          <p:nvPr/>
+        </p:nvSpPr>
+        <p:spPr>
+          <a:xfrm>
+            <a:off x="52092" y="-2814"/>
+            <a:ext cx="3677225" cy="523220"/>
+          </a:xfrm>
+          <a:prstGeom prst="rect">
+            <a:avLst/>
+          </a:prstGeom>
+          <a:noFill/>
+        </p:spPr>
+        <p:txBody>
+          <a:bodyPr wrap="none" rtlCol="0">
+            <a:spAutoFit/>
+          </a:bodyPr>
+          <a:lstStyle/>
+          <a:p>
+            <a:r>
+              <a:rPr lang="fr-FR" sz="2800" dirty="0"/>
+              <a:t>Production Architecture</a:t>
+            </a:r>
+          </a:p>
+        </p:txBody>
+      </p:sp>
+      <p:sp>
+        <p:nvSpPr>
+          <p:cNvPr id="27" name="Rectangle 26">
+            <a:extLst>
+              <a:ext uri="{FF2B5EF4-FFF2-40B4-BE49-F238E27FC236}">
+                <a16:creationId xmlns:a16="http://schemas.microsoft.com/office/drawing/2014/main" id="{57454060-7EB3-EB57-5EB6-883CA1D0DED4}"/>
+              </a:ext>
+            </a:extLst>
+          </p:cNvPr>
+          <p:cNvSpPr/>
+          <p:nvPr/>
+        </p:nvSpPr>
+        <p:spPr>
+          <a:xfrm>
+            <a:off x="7031780" y="2402863"/>
+            <a:ext cx="1030942" cy="735106"/>
+          </a:xfrm>
+          <a:prstGeom prst="rect">
+            <a:avLst/>
+          </a:prstGeom>
+        </p:spPr>
+        <p:style>
+          <a:lnRef idx="2">
+            <a:schemeClr val="accent1">
+              <a:shade val="15000"/>
+            </a:schemeClr>
+          </a:lnRef>
+          <a:fillRef idx="1">
+            <a:schemeClr val="accent1"/>
+          </a:fillRef>
+          <a:effectRef idx="0">
+            <a:schemeClr val="accent1"/>
+          </a:effectRef>
+          <a:fontRef idx="minor">
+            <a:schemeClr val="lt1"/>
+          </a:fontRef>
+        </p:style>
+        <p:txBody>
+          <a:bodyPr rtlCol="0" anchor="ctr"/>
+          <a:lstStyle/>
+          <a:p>
+            <a:pPr algn="ctr"/>
+            <a:r>
+              <a:rPr lang="fr-FR" dirty="0" err="1"/>
+              <a:t>Slimfass</a:t>
+            </a:r>
+            <a:endParaRPr lang="fr-FR" dirty="0"/>
+          </a:p>
+        </p:txBody>
+      </p:sp>
+      <p:sp>
+        <p:nvSpPr>
+          <p:cNvPr id="29" name="Rectangle 28">
+            <a:extLst>
+              <a:ext uri="{FF2B5EF4-FFF2-40B4-BE49-F238E27FC236}">
+                <a16:creationId xmlns:a16="http://schemas.microsoft.com/office/drawing/2014/main" id="{5C6904B0-222B-60CE-ADBC-111D0AFC6771}"/>
+              </a:ext>
+            </a:extLst>
+          </p:cNvPr>
+          <p:cNvSpPr/>
+          <p:nvPr/>
+        </p:nvSpPr>
+        <p:spPr>
+          <a:xfrm>
+            <a:off x="9375962" y="1319160"/>
+            <a:ext cx="1030942" cy="735106"/>
+          </a:xfrm>
+          <a:prstGeom prst="rect">
+            <a:avLst/>
+          </a:prstGeom>
+        </p:spPr>
+        <p:style>
+          <a:lnRef idx="2">
+            <a:schemeClr val="accent1">
+              <a:shade val="15000"/>
+            </a:schemeClr>
+          </a:lnRef>
+          <a:fillRef idx="1">
+            <a:schemeClr val="accent1"/>
+          </a:fillRef>
+          <a:effectRef idx="0">
+            <a:schemeClr val="accent1"/>
+          </a:effectRef>
+          <a:fontRef idx="minor">
+            <a:schemeClr val="lt1"/>
+          </a:fontRef>
+        </p:style>
+        <p:txBody>
+          <a:bodyPr rtlCol="0" anchor="ctr"/>
+          <a:lstStyle/>
+          <a:p>
+            <a:pPr algn="ctr"/>
+            <a:r>
+              <a:rPr lang="fr-FR" sz="1200" dirty="0"/>
+              <a:t>IA </a:t>
+            </a:r>
+            <a:r>
+              <a:rPr lang="fr-FR" sz="1200" dirty="0" err="1"/>
+              <a:t>Worker</a:t>
+            </a:r>
+            <a:endParaRPr lang="fr-FR" sz="1200" dirty="0"/>
+          </a:p>
+        </p:txBody>
+      </p:sp>
+      <p:pic>
+        <p:nvPicPr>
+          <p:cNvPr id="30" name="Picture 2" descr="Nvidia Logo - PNG y Vector">
+            <a:extLst>
+              <a:ext uri="{FF2B5EF4-FFF2-40B4-BE49-F238E27FC236}">
+                <a16:creationId xmlns:a16="http://schemas.microsoft.com/office/drawing/2014/main" id="{3E377BF5-604A-6C92-3987-312CC0AED4F7}"/>
+              </a:ext>
+            </a:extLst>
+          </p:cNvPr>
+          <p:cNvPicPr>
+            <a:picLocks noChangeAspect="1" noChangeArrowheads="1"/>
+          </p:cNvPicPr>
+          <p:nvPr/>
+        </p:nvPicPr>
+        <p:blipFill>
+          <a:blip r:embed="rId2">
+            <a:extLst>
+              <a:ext uri="{28A0092B-C50C-407E-A947-70E740481C1C}">
+                <a14:useLocalDpi xmlns:a14="http://schemas.microsoft.com/office/drawing/2010/main" val="0"/>
+              </a:ext>
+            </a:extLst>
+          </a:blip>
+          <a:srcRect/>
+          <a:stretch>
+            <a:fillRect/>
+          </a:stretch>
+        </p:blipFill>
+        <p:spPr bwMode="auto">
+          <a:xfrm>
+            <a:off x="9343096" y="1911964"/>
+            <a:ext cx="241006" cy="241006"/>
+          </a:xfrm>
+          <a:prstGeom prst="rect">
+            <a:avLst/>
+          </a:prstGeom>
+          <a:noFill/>
+          <a:extLst>
+            <a:ext uri="{909E8E84-426E-40DD-AFC4-6F175D3DCCD1}">
+              <a14:hiddenFill xmlns:a14="http://schemas.microsoft.com/office/drawing/2010/main">
+                <a:solidFill>
+                  <a:srgbClr val="FFFFFF"/>
+                </a:solidFill>
+              </a14:hiddenFill>
+            </a:ext>
+          </a:extLst>
+        </p:spPr>
+      </p:pic>
+      <p:sp>
+        <p:nvSpPr>
+          <p:cNvPr id="31" name="Rectangle 30">
+            <a:extLst>
+              <a:ext uri="{FF2B5EF4-FFF2-40B4-BE49-F238E27FC236}">
+                <a16:creationId xmlns:a16="http://schemas.microsoft.com/office/drawing/2014/main" id="{53A7A8BA-73DA-F19B-E705-D68813B52FD4}"/>
+              </a:ext>
+            </a:extLst>
+          </p:cNvPr>
+          <p:cNvSpPr/>
+          <p:nvPr/>
+        </p:nvSpPr>
+        <p:spPr>
+          <a:xfrm>
+            <a:off x="9584102" y="1931401"/>
+            <a:ext cx="336884" cy="202132"/>
+          </a:xfrm>
+          <a:prstGeom prst="rect">
+            <a:avLst/>
+          </a:prstGeom>
+          <a:solidFill>
+            <a:srgbClr val="92D050"/>
+          </a:solidFill>
+        </p:spPr>
+        <p:style>
+          <a:lnRef idx="2">
+            <a:schemeClr val="accent1">
+              <a:shade val="15000"/>
+            </a:schemeClr>
+          </a:lnRef>
+          <a:fillRef idx="1">
+            <a:schemeClr val="accent1"/>
+          </a:fillRef>
+          <a:effectRef idx="0">
+            <a:schemeClr val="accent1"/>
+          </a:effectRef>
+          <a:fontRef idx="minor">
+            <a:schemeClr val="lt1"/>
+          </a:fontRef>
+        </p:style>
+        <p:txBody>
+          <a:bodyPr rtlCol="0" anchor="ctr"/>
+          <a:lstStyle/>
+          <a:p>
+            <a:pPr algn="ctr"/>
+            <a:r>
+              <a:rPr lang="fr-FR" sz="1200" dirty="0"/>
+              <a:t>AI</a:t>
+            </a:r>
+          </a:p>
+        </p:txBody>
+      </p:sp>
+      <p:cxnSp>
+        <p:nvCxnSpPr>
+          <p:cNvPr id="39" name="Connecteur droit avec flèche 38">
+            <a:extLst>
+              <a:ext uri="{FF2B5EF4-FFF2-40B4-BE49-F238E27FC236}">
+                <a16:creationId xmlns:a16="http://schemas.microsoft.com/office/drawing/2014/main" id="{30176568-981F-B6DE-94E0-1B68C4D38319}"/>
+              </a:ext>
+            </a:extLst>
+          </p:cNvPr>
+          <p:cNvCxnSpPr>
+            <a:cxnSpLocks/>
+            <a:stCxn id="4" idx="0"/>
+            <a:endCxn id="38" idx="2"/>
+          </p:cNvCxnSpPr>
+          <p:nvPr/>
+        </p:nvCxnSpPr>
+        <p:spPr>
+          <a:xfrm flipV="1">
+            <a:off x="4946395" y="1638181"/>
+            <a:ext cx="2506655" cy="744874"/>
+          </a:xfrm>
+          <a:prstGeom prst="straightConnector1">
+            <a:avLst/>
+          </a:prstGeom>
+          <a:ln w="25400">
+            <a:solidFill>
+              <a:srgbClr val="002060"/>
+            </a:solidFill>
+            <a:tailEnd type="triangle"/>
+          </a:ln>
+        </p:spPr>
+        <p:style>
+          <a:lnRef idx="1">
+            <a:schemeClr val="accent1"/>
+          </a:lnRef>
+          <a:fillRef idx="0">
+            <a:schemeClr val="accent1"/>
+          </a:fillRef>
+          <a:effectRef idx="0">
+            <a:schemeClr val="accent1"/>
+          </a:effectRef>
+          <a:fontRef idx="minor">
+            <a:schemeClr val="tx1"/>
+          </a:fontRef>
+        </p:style>
+      </p:cxnSp>
+      <p:cxnSp>
+        <p:nvCxnSpPr>
+          <p:cNvPr id="47" name="Connecteur droit avec flèche 46">
+            <a:extLst>
+              <a:ext uri="{FF2B5EF4-FFF2-40B4-BE49-F238E27FC236}">
+                <a16:creationId xmlns:a16="http://schemas.microsoft.com/office/drawing/2014/main" id="{5B2CA26D-2B15-E389-6E8E-08C0665648E4}"/>
+              </a:ext>
+            </a:extLst>
+          </p:cNvPr>
+          <p:cNvCxnSpPr>
+            <a:cxnSpLocks/>
+            <a:stCxn id="21" idx="1"/>
+            <a:endCxn id="38" idx="2"/>
+          </p:cNvCxnSpPr>
+          <p:nvPr/>
+        </p:nvCxnSpPr>
+        <p:spPr>
+          <a:xfrm flipH="1" flipV="1">
+            <a:off x="7453050" y="1638181"/>
+            <a:ext cx="1906479" cy="974391"/>
+          </a:xfrm>
+          <a:prstGeom prst="straightConnector1">
+            <a:avLst/>
+          </a:prstGeom>
+          <a:ln w="25400">
+            <a:solidFill>
+              <a:srgbClr val="002060"/>
+            </a:solidFill>
+            <a:tailEnd type="triangle"/>
+          </a:ln>
+        </p:spPr>
+        <p:style>
+          <a:lnRef idx="1">
+            <a:schemeClr val="accent1"/>
+          </a:lnRef>
+          <a:fillRef idx="0">
+            <a:schemeClr val="accent1"/>
+          </a:fillRef>
+          <a:effectRef idx="0">
+            <a:schemeClr val="accent1"/>
+          </a:effectRef>
+          <a:fontRef idx="minor">
+            <a:schemeClr val="tx1"/>
+          </a:fontRef>
+        </p:style>
+      </p:cxnSp>
+      <p:sp>
+        <p:nvSpPr>
+          <p:cNvPr id="56" name="ZoneTexte 55">
+            <a:extLst>
+              <a:ext uri="{FF2B5EF4-FFF2-40B4-BE49-F238E27FC236}">
+                <a16:creationId xmlns:a16="http://schemas.microsoft.com/office/drawing/2014/main" id="{4E6D7C8F-FCCD-CB39-9054-10F8F9DC1F10}"/>
+              </a:ext>
+            </a:extLst>
+          </p:cNvPr>
+          <p:cNvSpPr txBox="1"/>
+          <p:nvPr/>
+        </p:nvSpPr>
+        <p:spPr>
+          <a:xfrm>
+            <a:off x="4258434" y="973245"/>
+            <a:ext cx="1833033" cy="1107996"/>
+          </a:xfrm>
+          <a:prstGeom prst="rect">
+            <a:avLst/>
+          </a:prstGeom>
+          <a:noFill/>
+        </p:spPr>
+        <p:txBody>
+          <a:bodyPr wrap="square" rtlCol="0">
+            <a:spAutoFit/>
+          </a:bodyPr>
+          <a:lstStyle/>
+          <a:p>
+            <a:r>
+              <a:rPr lang="fr-FR" sz="1100" b="1" dirty="0"/>
+              <a:t>Etape 2</a:t>
+            </a:r>
+          </a:p>
+          <a:p>
+            <a:r>
+              <a:rPr lang="fr-FR" sz="1100" dirty="0"/>
+              <a:t>On pousse les données dans redis avec un ID que l’on génère. Et on réalise un appel asynchrone au </a:t>
+            </a:r>
+            <a:r>
+              <a:rPr lang="fr-FR" sz="1100" dirty="0" err="1"/>
+              <a:t>worker</a:t>
+            </a:r>
+            <a:r>
+              <a:rPr lang="fr-FR" sz="1100" dirty="0"/>
+              <a:t>.</a:t>
+            </a:r>
+          </a:p>
+          <a:p>
+            <a:endParaRPr lang="fr-FR" sz="1100" dirty="0"/>
+          </a:p>
+        </p:txBody>
+      </p:sp>
+      <p:sp>
+        <p:nvSpPr>
+          <p:cNvPr id="57" name="ZoneTexte 56">
+            <a:extLst>
+              <a:ext uri="{FF2B5EF4-FFF2-40B4-BE49-F238E27FC236}">
+                <a16:creationId xmlns:a16="http://schemas.microsoft.com/office/drawing/2014/main" id="{05720F88-1959-2663-74F1-CD20F3707280}"/>
+              </a:ext>
+            </a:extLst>
+          </p:cNvPr>
+          <p:cNvSpPr txBox="1"/>
+          <p:nvPr/>
+        </p:nvSpPr>
+        <p:spPr>
+          <a:xfrm>
+            <a:off x="10062742" y="4616391"/>
+            <a:ext cx="1186543" cy="430887"/>
+          </a:xfrm>
+          <a:prstGeom prst="rect">
+            <a:avLst/>
+          </a:prstGeom>
+          <a:noFill/>
+        </p:spPr>
+        <p:txBody>
+          <a:bodyPr wrap="none" rtlCol="0">
+            <a:spAutoFit/>
+          </a:bodyPr>
+          <a:lstStyle/>
+          <a:p>
+            <a:r>
+              <a:rPr lang="fr-FR" sz="1100" dirty="0"/>
+              <a:t>Consume chunck </a:t>
+            </a:r>
+          </a:p>
+          <a:p>
+            <a:r>
+              <a:rPr lang="fr-FR" sz="1100" dirty="0"/>
+              <a:t>of text </a:t>
+            </a:r>
+          </a:p>
+        </p:txBody>
+      </p:sp>
+      <p:cxnSp>
+        <p:nvCxnSpPr>
+          <p:cNvPr id="5" name="Connecteur droit avec flèche 4">
+            <a:extLst>
+              <a:ext uri="{FF2B5EF4-FFF2-40B4-BE49-F238E27FC236}">
+                <a16:creationId xmlns:a16="http://schemas.microsoft.com/office/drawing/2014/main" id="{10989B38-C5B2-8B6F-AE5F-905514BBCABF}"/>
+              </a:ext>
+            </a:extLst>
+          </p:cNvPr>
+          <p:cNvCxnSpPr>
+            <a:cxnSpLocks/>
+          </p:cNvCxnSpPr>
+          <p:nvPr/>
+        </p:nvCxnSpPr>
+        <p:spPr>
+          <a:xfrm flipH="1">
+            <a:off x="1201434" y="2961830"/>
+            <a:ext cx="3229490" cy="0"/>
+          </a:xfrm>
+          <a:prstGeom prst="straightConnector1">
+            <a:avLst/>
+          </a:prstGeom>
+          <a:ln w="25400">
+            <a:solidFill>
+              <a:srgbClr val="00B050"/>
+            </a:solidFill>
+            <a:headEnd type="none"/>
+            <a:tailEnd type="triangle"/>
+          </a:ln>
+        </p:spPr>
+        <p:style>
+          <a:lnRef idx="1">
+            <a:schemeClr val="accent1"/>
+          </a:lnRef>
+          <a:fillRef idx="0">
+            <a:schemeClr val="accent1"/>
+          </a:fillRef>
+          <a:effectRef idx="0">
+            <a:schemeClr val="accent1"/>
+          </a:effectRef>
+          <a:fontRef idx="minor">
+            <a:schemeClr val="tx1"/>
+          </a:fontRef>
+        </p:style>
+      </p:cxnSp>
+      <p:sp>
+        <p:nvSpPr>
+          <p:cNvPr id="16" name="ZoneTexte 15">
+            <a:extLst>
+              <a:ext uri="{FF2B5EF4-FFF2-40B4-BE49-F238E27FC236}">
+                <a16:creationId xmlns:a16="http://schemas.microsoft.com/office/drawing/2014/main" id="{A808C64E-F3AF-F9E2-52D7-8D6C21621B0C}"/>
+              </a:ext>
+            </a:extLst>
+          </p:cNvPr>
+          <p:cNvSpPr txBox="1"/>
+          <p:nvPr/>
+        </p:nvSpPr>
+        <p:spPr>
+          <a:xfrm>
+            <a:off x="1470507" y="475797"/>
+            <a:ext cx="1916807" cy="2123658"/>
+          </a:xfrm>
+          <a:prstGeom prst="rect">
+            <a:avLst/>
+          </a:prstGeom>
+          <a:noFill/>
+        </p:spPr>
+        <p:txBody>
+          <a:bodyPr wrap="square" rtlCol="0">
+            <a:spAutoFit/>
+          </a:bodyPr>
+          <a:lstStyle/>
+          <a:p>
+            <a:r>
+              <a:rPr lang="fr-FR" sz="1200" b="1" u="sng" dirty="0"/>
+              <a:t>Etape 1 </a:t>
+            </a:r>
+            <a:br>
+              <a:rPr lang="fr-FR" sz="1200" dirty="0"/>
+            </a:br>
+            <a:r>
+              <a:rPr lang="fr-FR" sz="1200" dirty="0"/>
+              <a:t>On découpe le son en plusieurs morceaux </a:t>
+            </a:r>
+            <a:r>
+              <a:rPr lang="fr-FR" sz="1200" dirty="0" err="1"/>
+              <a:t>chunk</a:t>
+            </a:r>
+            <a:r>
+              <a:rPr lang="fr-FR" sz="1200" dirty="0"/>
+              <a:t> (à chaque baisse d’</a:t>
+            </a:r>
+            <a:r>
+              <a:rPr lang="fr-FR" sz="1200" dirty="0" err="1"/>
+              <a:t>intenssité</a:t>
+            </a:r>
+            <a:r>
+              <a:rPr lang="fr-FR" sz="1200" dirty="0"/>
+              <a:t> pendant une période donnée)</a:t>
+            </a:r>
+          </a:p>
+          <a:p>
+            <a:endParaRPr lang="fr-FR" sz="1200" dirty="0"/>
+          </a:p>
+          <a:p>
+            <a:r>
+              <a:rPr lang="fr-FR" sz="1200"/>
+              <a:t>TTP </a:t>
+            </a:r>
+            <a:r>
+              <a:rPr lang="fr-FR" sz="1200" dirty="0"/>
+              <a:t>POST /audio :</a:t>
+            </a:r>
+          </a:p>
+          <a:p>
+            <a:pPr marL="171450" indent="-171450">
+              <a:buFontTx/>
+              <a:buChar char="-"/>
+            </a:pPr>
+            <a:r>
+              <a:rPr lang="fr-FR" sz="1200" dirty="0"/>
+              <a:t>Stream du son</a:t>
+            </a:r>
+          </a:p>
+          <a:p>
+            <a:pPr marL="171450" indent="-171450">
+              <a:buFontTx/>
+              <a:buChar char="-"/>
+            </a:pPr>
+            <a:r>
+              <a:rPr lang="fr-FR" sz="1200" dirty="0"/>
+              <a:t>Index du </a:t>
+            </a:r>
+            <a:r>
+              <a:rPr lang="fr-FR" sz="1200" dirty="0" err="1"/>
+              <a:t>chunk</a:t>
+            </a:r>
+            <a:endParaRPr lang="fr-FR" sz="1200" dirty="0"/>
+          </a:p>
+          <a:p>
+            <a:pPr marL="171450" indent="-171450">
+              <a:buFontTx/>
+              <a:buChar char="-"/>
+            </a:pPr>
+            <a:r>
+              <a:rPr lang="fr-FR" sz="1200" dirty="0" err="1"/>
+              <a:t>ClientID</a:t>
+            </a:r>
+            <a:endParaRPr lang="fr-FR" sz="1200" dirty="0"/>
+          </a:p>
+        </p:txBody>
+      </p:sp>
+      <p:sp>
+        <p:nvSpPr>
+          <p:cNvPr id="21" name="Rectangle 20">
+            <a:extLst>
+              <a:ext uri="{FF2B5EF4-FFF2-40B4-BE49-F238E27FC236}">
+                <a16:creationId xmlns:a16="http://schemas.microsoft.com/office/drawing/2014/main" id="{8B139D03-83F4-9D24-E19B-5C9E3E6819F9}"/>
+              </a:ext>
+            </a:extLst>
+          </p:cNvPr>
+          <p:cNvSpPr/>
+          <p:nvPr/>
+        </p:nvSpPr>
+        <p:spPr>
+          <a:xfrm>
+            <a:off x="9359529" y="2245019"/>
+            <a:ext cx="1030942" cy="735106"/>
+          </a:xfrm>
+          <a:prstGeom prst="rect">
+            <a:avLst/>
+          </a:prstGeom>
+        </p:spPr>
+        <p:style>
+          <a:lnRef idx="2">
+            <a:schemeClr val="accent1">
+              <a:shade val="15000"/>
+            </a:schemeClr>
+          </a:lnRef>
+          <a:fillRef idx="1">
+            <a:schemeClr val="accent1"/>
+          </a:fillRef>
+          <a:effectRef idx="0">
+            <a:schemeClr val="accent1"/>
+          </a:effectRef>
+          <a:fontRef idx="minor">
+            <a:schemeClr val="lt1"/>
+          </a:fontRef>
+        </p:style>
+        <p:txBody>
+          <a:bodyPr rtlCol="0" anchor="ctr"/>
+          <a:lstStyle/>
+          <a:p>
+            <a:pPr algn="ctr"/>
+            <a:r>
+              <a:rPr lang="fr-FR" sz="1200" dirty="0"/>
+              <a:t>IA </a:t>
+            </a:r>
+            <a:r>
+              <a:rPr lang="fr-FR" sz="1200" dirty="0" err="1"/>
+              <a:t>Worker</a:t>
+            </a:r>
+            <a:endParaRPr lang="fr-FR" sz="1200" dirty="0"/>
+          </a:p>
+        </p:txBody>
+      </p:sp>
+      <p:pic>
+        <p:nvPicPr>
+          <p:cNvPr id="22" name="Picture 2" descr="Nvidia Logo - PNG y Vector">
+            <a:extLst>
+              <a:ext uri="{FF2B5EF4-FFF2-40B4-BE49-F238E27FC236}">
+                <a16:creationId xmlns:a16="http://schemas.microsoft.com/office/drawing/2014/main" id="{8C748C88-41EA-DC60-8971-FFD81AED953D}"/>
+              </a:ext>
+            </a:extLst>
+          </p:cNvPr>
+          <p:cNvPicPr>
+            <a:picLocks noChangeAspect="1" noChangeArrowheads="1"/>
+          </p:cNvPicPr>
+          <p:nvPr/>
+        </p:nvPicPr>
+        <p:blipFill>
+          <a:blip r:embed="rId2">
+            <a:extLst>
+              <a:ext uri="{28A0092B-C50C-407E-A947-70E740481C1C}">
+                <a14:useLocalDpi xmlns:a14="http://schemas.microsoft.com/office/drawing/2010/main" val="0"/>
+              </a:ext>
+            </a:extLst>
+          </a:blip>
+          <a:srcRect/>
+          <a:stretch>
+            <a:fillRect/>
+          </a:stretch>
+        </p:blipFill>
+        <p:spPr bwMode="auto">
+          <a:xfrm>
+            <a:off x="9326663" y="2837823"/>
+            <a:ext cx="241006" cy="241006"/>
+          </a:xfrm>
+          <a:prstGeom prst="rect">
+            <a:avLst/>
+          </a:prstGeom>
+          <a:noFill/>
+          <a:extLst>
+            <a:ext uri="{909E8E84-426E-40DD-AFC4-6F175D3DCCD1}">
+              <a14:hiddenFill xmlns:a14="http://schemas.microsoft.com/office/drawing/2010/main">
+                <a:solidFill>
+                  <a:srgbClr val="FFFFFF"/>
+                </a:solidFill>
+              </a14:hiddenFill>
+            </a:ext>
+          </a:extLst>
+        </p:spPr>
+      </p:pic>
+      <p:sp>
+        <p:nvSpPr>
+          <p:cNvPr id="23" name="Rectangle 22">
+            <a:extLst>
+              <a:ext uri="{FF2B5EF4-FFF2-40B4-BE49-F238E27FC236}">
+                <a16:creationId xmlns:a16="http://schemas.microsoft.com/office/drawing/2014/main" id="{51AF5554-9F35-7FEF-4A07-0222CE37F7EB}"/>
+              </a:ext>
+            </a:extLst>
+          </p:cNvPr>
+          <p:cNvSpPr/>
+          <p:nvPr/>
+        </p:nvSpPr>
+        <p:spPr>
+          <a:xfrm>
+            <a:off x="9567669" y="2857260"/>
+            <a:ext cx="336884" cy="202132"/>
+          </a:xfrm>
+          <a:prstGeom prst="rect">
+            <a:avLst/>
+          </a:prstGeom>
+          <a:solidFill>
+            <a:srgbClr val="92D050"/>
+          </a:solidFill>
+        </p:spPr>
+        <p:style>
+          <a:lnRef idx="2">
+            <a:schemeClr val="accent1">
+              <a:shade val="15000"/>
+            </a:schemeClr>
+          </a:lnRef>
+          <a:fillRef idx="1">
+            <a:schemeClr val="accent1"/>
+          </a:fillRef>
+          <a:effectRef idx="0">
+            <a:schemeClr val="accent1"/>
+          </a:effectRef>
+          <a:fontRef idx="minor">
+            <a:schemeClr val="lt1"/>
+          </a:fontRef>
+        </p:style>
+        <p:txBody>
+          <a:bodyPr rtlCol="0" anchor="ctr"/>
+          <a:lstStyle/>
+          <a:p>
+            <a:pPr algn="ctr"/>
+            <a:r>
+              <a:rPr lang="fr-FR" sz="1200" dirty="0"/>
+              <a:t>AI</a:t>
+            </a:r>
+          </a:p>
+        </p:txBody>
+      </p:sp>
+      <p:sp>
+        <p:nvSpPr>
+          <p:cNvPr id="25" name="Rectangle 24">
+            <a:extLst>
+              <a:ext uri="{FF2B5EF4-FFF2-40B4-BE49-F238E27FC236}">
+                <a16:creationId xmlns:a16="http://schemas.microsoft.com/office/drawing/2014/main" id="{39AA5939-9EF6-6F96-E117-D931F2606BB1}"/>
+              </a:ext>
+            </a:extLst>
+          </p:cNvPr>
+          <p:cNvSpPr/>
+          <p:nvPr/>
+        </p:nvSpPr>
+        <p:spPr>
+          <a:xfrm>
+            <a:off x="9375962" y="3137969"/>
+            <a:ext cx="1030942" cy="735106"/>
+          </a:xfrm>
+          <a:prstGeom prst="rect">
+            <a:avLst/>
+          </a:prstGeom>
+        </p:spPr>
+        <p:style>
+          <a:lnRef idx="2">
+            <a:schemeClr val="accent1">
+              <a:shade val="15000"/>
+            </a:schemeClr>
+          </a:lnRef>
+          <a:fillRef idx="1">
+            <a:schemeClr val="accent1"/>
+          </a:fillRef>
+          <a:effectRef idx="0">
+            <a:schemeClr val="accent1"/>
+          </a:effectRef>
+          <a:fontRef idx="minor">
+            <a:schemeClr val="lt1"/>
+          </a:fontRef>
+        </p:style>
+        <p:txBody>
+          <a:bodyPr rtlCol="0" anchor="ctr"/>
+          <a:lstStyle/>
+          <a:p>
+            <a:pPr algn="ctr"/>
+            <a:r>
+              <a:rPr lang="fr-FR" sz="1200" dirty="0"/>
+              <a:t>IA </a:t>
+            </a:r>
+            <a:r>
+              <a:rPr lang="fr-FR" sz="1200" dirty="0" err="1"/>
+              <a:t>Worker</a:t>
+            </a:r>
+            <a:endParaRPr lang="fr-FR" sz="1200" dirty="0"/>
+          </a:p>
+        </p:txBody>
+      </p:sp>
+      <p:pic>
+        <p:nvPicPr>
+          <p:cNvPr id="26" name="Picture 2" descr="Nvidia Logo - PNG y Vector">
+            <a:extLst>
+              <a:ext uri="{FF2B5EF4-FFF2-40B4-BE49-F238E27FC236}">
+                <a16:creationId xmlns:a16="http://schemas.microsoft.com/office/drawing/2014/main" id="{DC11220F-8407-7230-BA2F-6CD3739FB05B}"/>
+              </a:ext>
+            </a:extLst>
+          </p:cNvPr>
+          <p:cNvPicPr>
+            <a:picLocks noChangeAspect="1" noChangeArrowheads="1"/>
+          </p:cNvPicPr>
+          <p:nvPr/>
+        </p:nvPicPr>
+        <p:blipFill>
+          <a:blip r:embed="rId2">
+            <a:extLst>
+              <a:ext uri="{28A0092B-C50C-407E-A947-70E740481C1C}">
+                <a14:useLocalDpi xmlns:a14="http://schemas.microsoft.com/office/drawing/2010/main" val="0"/>
+              </a:ext>
+            </a:extLst>
+          </a:blip>
+          <a:srcRect/>
+          <a:stretch>
+            <a:fillRect/>
+          </a:stretch>
+        </p:blipFill>
+        <p:spPr bwMode="auto">
+          <a:xfrm>
+            <a:off x="9343096" y="3730773"/>
+            <a:ext cx="241006" cy="241006"/>
+          </a:xfrm>
+          <a:prstGeom prst="rect">
+            <a:avLst/>
+          </a:prstGeom>
+          <a:noFill/>
+          <a:extLst>
+            <a:ext uri="{909E8E84-426E-40DD-AFC4-6F175D3DCCD1}">
+              <a14:hiddenFill xmlns:a14="http://schemas.microsoft.com/office/drawing/2010/main">
+                <a:solidFill>
+                  <a:srgbClr val="FFFFFF"/>
+                </a:solidFill>
+              </a14:hiddenFill>
+            </a:ext>
+          </a:extLst>
+        </p:spPr>
+      </p:pic>
+      <p:sp>
+        <p:nvSpPr>
+          <p:cNvPr id="32" name="Rectangle 31">
+            <a:extLst>
+              <a:ext uri="{FF2B5EF4-FFF2-40B4-BE49-F238E27FC236}">
+                <a16:creationId xmlns:a16="http://schemas.microsoft.com/office/drawing/2014/main" id="{017722C7-24E6-8DB8-D998-6962AE772C87}"/>
+              </a:ext>
+            </a:extLst>
+          </p:cNvPr>
+          <p:cNvSpPr/>
+          <p:nvPr/>
+        </p:nvSpPr>
+        <p:spPr>
+          <a:xfrm>
+            <a:off x="9584102" y="3750210"/>
+            <a:ext cx="336884" cy="202132"/>
+          </a:xfrm>
+          <a:prstGeom prst="rect">
+            <a:avLst/>
+          </a:prstGeom>
+          <a:solidFill>
+            <a:srgbClr val="92D050"/>
+          </a:solidFill>
+        </p:spPr>
+        <p:style>
+          <a:lnRef idx="2">
+            <a:schemeClr val="accent1">
+              <a:shade val="15000"/>
+            </a:schemeClr>
+          </a:lnRef>
+          <a:fillRef idx="1">
+            <a:schemeClr val="accent1"/>
+          </a:fillRef>
+          <a:effectRef idx="0">
+            <a:schemeClr val="accent1"/>
+          </a:effectRef>
+          <a:fontRef idx="minor">
+            <a:schemeClr val="lt1"/>
+          </a:fontRef>
+        </p:style>
+        <p:txBody>
+          <a:bodyPr rtlCol="0" anchor="ctr"/>
+          <a:lstStyle/>
+          <a:p>
+            <a:pPr algn="ctr"/>
+            <a:r>
+              <a:rPr lang="fr-FR" sz="1200" dirty="0"/>
+              <a:t>AI</a:t>
+            </a:r>
+          </a:p>
+        </p:txBody>
+      </p:sp>
+      <p:sp>
+        <p:nvSpPr>
+          <p:cNvPr id="38" name="Rectangle 37">
+            <a:extLst>
+              <a:ext uri="{FF2B5EF4-FFF2-40B4-BE49-F238E27FC236}">
+                <a16:creationId xmlns:a16="http://schemas.microsoft.com/office/drawing/2014/main" id="{53EDDDD8-CAD6-C306-BFC5-BC6E9824CA8F}"/>
+              </a:ext>
+            </a:extLst>
+          </p:cNvPr>
+          <p:cNvSpPr/>
+          <p:nvPr/>
+        </p:nvSpPr>
+        <p:spPr>
+          <a:xfrm>
+            <a:off x="6972929" y="1172916"/>
+            <a:ext cx="960241" cy="465265"/>
+          </a:xfrm>
+          <a:prstGeom prst="rect">
+            <a:avLst/>
+          </a:prstGeom>
+        </p:spPr>
+        <p:style>
+          <a:lnRef idx="2">
+            <a:schemeClr val="accent1">
+              <a:shade val="15000"/>
+            </a:schemeClr>
+          </a:lnRef>
+          <a:fillRef idx="1">
+            <a:schemeClr val="accent1"/>
+          </a:fillRef>
+          <a:effectRef idx="0">
+            <a:schemeClr val="accent1"/>
+          </a:effectRef>
+          <a:fontRef idx="minor">
+            <a:schemeClr val="lt1"/>
+          </a:fontRef>
+        </p:style>
+        <p:txBody>
+          <a:bodyPr rtlCol="0" anchor="ctr"/>
+          <a:lstStyle/>
+          <a:p>
+            <a:pPr algn="ctr"/>
+            <a:r>
+              <a:rPr lang="fr-FR" dirty="0"/>
+              <a:t>Redis</a:t>
+            </a:r>
+          </a:p>
+        </p:txBody>
+      </p:sp>
+      <p:cxnSp>
+        <p:nvCxnSpPr>
+          <p:cNvPr id="49" name="Connecteur droit avec flèche 48">
+            <a:extLst>
+              <a:ext uri="{FF2B5EF4-FFF2-40B4-BE49-F238E27FC236}">
+                <a16:creationId xmlns:a16="http://schemas.microsoft.com/office/drawing/2014/main" id="{2C81B008-F75F-AA69-B316-0C10A4FD05E7}"/>
+              </a:ext>
+            </a:extLst>
+          </p:cNvPr>
+          <p:cNvCxnSpPr>
+            <a:cxnSpLocks/>
+          </p:cNvCxnSpPr>
+          <p:nvPr/>
+        </p:nvCxnSpPr>
+        <p:spPr>
+          <a:xfrm>
+            <a:off x="5461866" y="2612572"/>
+            <a:ext cx="1569914" cy="0"/>
+          </a:xfrm>
+          <a:prstGeom prst="straightConnector1">
+            <a:avLst/>
+          </a:prstGeom>
+          <a:ln w="25400">
+            <a:solidFill>
+              <a:srgbClr val="00B050"/>
+            </a:solidFill>
+            <a:headEnd type="none"/>
+            <a:tailEnd type="triangle"/>
+          </a:ln>
+        </p:spPr>
+        <p:style>
+          <a:lnRef idx="1">
+            <a:schemeClr val="accent1"/>
+          </a:lnRef>
+          <a:fillRef idx="0">
+            <a:schemeClr val="accent1"/>
+          </a:fillRef>
+          <a:effectRef idx="0">
+            <a:schemeClr val="accent1"/>
+          </a:effectRef>
+          <a:fontRef idx="minor">
+            <a:schemeClr val="tx1"/>
+          </a:fontRef>
+        </p:style>
+      </p:cxnSp>
+    </p:spTree>
+    <p:extLst>
+      <p:ext uri="{BB962C8B-B14F-4D97-AF65-F5344CB8AC3E}">
+        <p14:creationId xmlns:p14="http://schemas.microsoft.com/office/powerpoint/2010/main" val="3734232362"/>
+      </p:ext>
+    </p:extLst>
+  </p:cSld>
+  <p:clrMapOvr>
+    <a:masterClrMapping/>
+  </p:clrMapOvr>
+</p:sld>
+</file>
+
 <file path=ppt/theme/theme1.xml><?xml version="1.0" encoding="utf-8"?>
 <a:theme xmlns:a="http://schemas.openxmlformats.org/drawingml/2006/main" name="Thème Office">
   <a:themeElements>

</xml_diff>

<commit_message>
feat(all): update to latest slimfaas
</commit_message>
<xml_diff>
--- a/documentation/Architecture.pptx
+++ b/documentation/Architecture.pptx
@@ -262,7 +262,7 @@
           <a:p>
             <a:fld id="{2FADB740-130C-40E2-9E3D-8BF44594D57F}" type="datetimeFigureOut">
               <a:rPr lang="fr-FR" smtClean="0"/>
-              <a:t>01/11/2024</a:t>
+              <a:t>04/10/2025</a:t>
             </a:fld>
             <a:endParaRPr lang="fr-FR"/>
           </a:p>
@@ -460,7 +460,7 @@
           <a:p>
             <a:fld id="{2FADB740-130C-40E2-9E3D-8BF44594D57F}" type="datetimeFigureOut">
               <a:rPr lang="fr-FR" smtClean="0"/>
-              <a:t>01/11/2024</a:t>
+              <a:t>04/10/2025</a:t>
             </a:fld>
             <a:endParaRPr lang="fr-FR"/>
           </a:p>
@@ -668,7 +668,7 @@
           <a:p>
             <a:fld id="{2FADB740-130C-40E2-9E3D-8BF44594D57F}" type="datetimeFigureOut">
               <a:rPr lang="fr-FR" smtClean="0"/>
-              <a:t>01/11/2024</a:t>
+              <a:t>04/10/2025</a:t>
             </a:fld>
             <a:endParaRPr lang="fr-FR"/>
           </a:p>
@@ -866,7 +866,7 @@
           <a:p>
             <a:fld id="{2FADB740-130C-40E2-9E3D-8BF44594D57F}" type="datetimeFigureOut">
               <a:rPr lang="fr-FR" smtClean="0"/>
-              <a:t>01/11/2024</a:t>
+              <a:t>04/10/2025</a:t>
             </a:fld>
             <a:endParaRPr lang="fr-FR"/>
           </a:p>
@@ -1141,7 +1141,7 @@
           <a:p>
             <a:fld id="{2FADB740-130C-40E2-9E3D-8BF44594D57F}" type="datetimeFigureOut">
               <a:rPr lang="fr-FR" smtClean="0"/>
-              <a:t>01/11/2024</a:t>
+              <a:t>04/10/2025</a:t>
             </a:fld>
             <a:endParaRPr lang="fr-FR"/>
           </a:p>
@@ -1406,7 +1406,7 @@
           <a:p>
             <a:fld id="{2FADB740-130C-40E2-9E3D-8BF44594D57F}" type="datetimeFigureOut">
               <a:rPr lang="fr-FR" smtClean="0"/>
-              <a:t>01/11/2024</a:t>
+              <a:t>04/10/2025</a:t>
             </a:fld>
             <a:endParaRPr lang="fr-FR"/>
           </a:p>
@@ -1818,7 +1818,7 @@
           <a:p>
             <a:fld id="{2FADB740-130C-40E2-9E3D-8BF44594D57F}" type="datetimeFigureOut">
               <a:rPr lang="fr-FR" smtClean="0"/>
-              <a:t>01/11/2024</a:t>
+              <a:t>04/10/2025</a:t>
             </a:fld>
             <a:endParaRPr lang="fr-FR"/>
           </a:p>
@@ -1959,7 +1959,7 @@
           <a:p>
             <a:fld id="{2FADB740-130C-40E2-9E3D-8BF44594D57F}" type="datetimeFigureOut">
               <a:rPr lang="fr-FR" smtClean="0"/>
-              <a:t>01/11/2024</a:t>
+              <a:t>04/10/2025</a:t>
             </a:fld>
             <a:endParaRPr lang="fr-FR"/>
           </a:p>
@@ -2072,7 +2072,7 @@
           <a:p>
             <a:fld id="{2FADB740-130C-40E2-9E3D-8BF44594D57F}" type="datetimeFigureOut">
               <a:rPr lang="fr-FR" smtClean="0"/>
-              <a:t>01/11/2024</a:t>
+              <a:t>04/10/2025</a:t>
             </a:fld>
             <a:endParaRPr lang="fr-FR"/>
           </a:p>
@@ -2383,7 +2383,7 @@
           <a:p>
             <a:fld id="{2FADB740-130C-40E2-9E3D-8BF44594D57F}" type="datetimeFigureOut">
               <a:rPr lang="fr-FR" smtClean="0"/>
-              <a:t>01/11/2024</a:t>
+              <a:t>04/10/2025</a:t>
             </a:fld>
             <a:endParaRPr lang="fr-FR"/>
           </a:p>
@@ -2671,7 +2671,7 @@
           <a:p>
             <a:fld id="{2FADB740-130C-40E2-9E3D-8BF44594D57F}" type="datetimeFigureOut">
               <a:rPr lang="fr-FR" smtClean="0"/>
-              <a:t>01/11/2024</a:t>
+              <a:t>04/10/2025</a:t>
             </a:fld>
             <a:endParaRPr lang="fr-FR"/>
           </a:p>
@@ -2912,7 +2912,7 @@
           <a:p>
             <a:fld id="{2FADB740-130C-40E2-9E3D-8BF44594D57F}" type="datetimeFigureOut">
               <a:rPr lang="fr-FR" smtClean="0"/>
-              <a:t>01/11/2024</a:t>
+              <a:t>04/10/2025</a:t>
             </a:fld>
             <a:endParaRPr lang="fr-FR"/>
           </a:p>
@@ -3005,6 +3005,56 @@
               <a:t>‹N°›</a:t>
             </a:fld>
             <a:endParaRPr lang="fr-FR"/>
+          </a:p>
+        </p:txBody>
+      </p:sp>
+      <p:sp>
+        <p:nvSpPr>
+          <p:cNvPr id="8" name="ZoneTexte 7">
+            <a:extLst>
+              <a:ext uri="{FF2B5EF4-FFF2-40B4-BE49-F238E27FC236}">
+                <a16:creationId xmlns:a16="http://schemas.microsoft.com/office/drawing/2014/main" id="{47412948-221C-46F0-389F-F4F1ECCE7DAE}"/>
+              </a:ext>
+            </a:extLst>
+          </p:cNvPr>
+          <p:cNvSpPr txBox="1"/>
+          <p:nvPr userDrawn="1">
+            <p:extLst>
+              <p:ext uri="{1162E1C5-73C7-4A58-AE30-91384D911F3F}">
+                <p184:classification xmlns:p184="http://schemas.microsoft.com/office/powerpoint/2018/4/main" val="ftr"/>
+              </p:ext>
+            </p:extLst>
+          </p:nvPr>
+        </p:nvSpPr>
+        <p:spPr>
+          <a:xfrm>
+            <a:off x="63500" y="6642100"/>
+            <a:ext cx="2563813" cy="152400"/>
+          </a:xfrm>
+          <a:prstGeom prst="rect">
+            <a:avLst/>
+          </a:prstGeom>
+        </p:spPr>
+        <p:txBody>
+          <a:bodyPr horzOverflow="overflow" lIns="0" tIns="0" rIns="0" bIns="0">
+            <a:spAutoFit/>
+          </a:bodyPr>
+          <a:lstStyle/>
+          <a:p>
+            <a:pPr algn="l"/>
+            <a:r>
+              <a:rPr lang="fr-FR" sz="1000">
+                <a:solidFill>
+                  <a:srgbClr val="000000">
+                    <a:alpha val="50000"/>
+                  </a:srgbClr>
+                </a:solidFill>
+                <a:latin typeface="Calibri" panose="020F0502020204030204" pitchFamily="34" charset="0"/>
+                <a:ea typeface="Calibri" panose="020F0502020204030204" pitchFamily="34" charset="0"/>
+                <a:cs typeface="Calibri" panose="020F0502020204030204" pitchFamily="34" charset="0"/>
+              </a:rPr>
+              <a:t>  Classification : Confidentiel - Donnée Entreprise </a:t>
+            </a:r>
           </a:p>
         </p:txBody>
       </p:sp>
@@ -5497,8 +5547,8 @@
         </p:nvSpPr>
         <p:spPr>
           <a:xfrm>
-            <a:off x="1074487" y="3496050"/>
-            <a:ext cx="1328154" cy="276999"/>
+            <a:off x="1201434" y="3056915"/>
+            <a:ext cx="1328154" cy="461665"/>
           </a:xfrm>
           <a:prstGeom prst="rect">
             <a:avLst/>
@@ -5513,7 +5563,7 @@
           <a:p>
             <a:r>
               <a:rPr lang="fr-FR" sz="1200" dirty="0"/>
-              <a:t>HTTP EventSource </a:t>
+              <a:t>HTTP Server Send Events </a:t>
             </a:r>
           </a:p>
         </p:txBody>
@@ -6021,7 +6071,7 @@
                   </a:schemeClr>
                 </a:solidFill>
               </a:rPr>
-              <a:t>Bytes du son</a:t>
+              <a:t>Sound Bytes </a:t>
             </a:r>
           </a:p>
           <a:p>
@@ -6029,6 +6079,16 @@
               <a:buFontTx/>
               <a:buChar char="-"/>
             </a:pPr>
+            <a:r>
+              <a:rPr lang="fr-FR" sz="1200" dirty="0" err="1">
+                <a:solidFill>
+                  <a:schemeClr val="accent6">
+                    <a:lumMod val="75000"/>
+                  </a:schemeClr>
+                </a:solidFill>
+              </a:rPr>
+              <a:t>Chunk</a:t>
+            </a:r>
             <a:r>
               <a:rPr lang="fr-FR" sz="1200" dirty="0">
                 <a:solidFill>
@@ -6037,7 +6097,7 @@
                   </a:schemeClr>
                 </a:solidFill>
               </a:rPr>
-              <a:t>Index du chunk</a:t>
+              <a:t> Index</a:t>
             </a:r>
           </a:p>
           <a:p>

</xml_diff>